<commit_message>
add final vers presentation
</commit_message>
<xml_diff>
--- a/week_03/day_4/Presentation_data_ethics.pptx
+++ b/week_03/day_4/Presentation_data_ethics.pptx
@@ -511,9 +511,71 @@
           <a:lstStyle/>
           <a:p>
             <a:r>
-              <a:rPr lang="en-NL" dirty="0"/>
-              <a:t>My data ethics case</a:t>
-            </a:r>
+              <a:rPr lang="en-GB" sz="1800" kern="100" dirty="0">
+                <a:effectLst/>
+                <a:latin typeface="Calibri" panose="020F0502020204030204" pitchFamily="34" charset="0"/>
+                <a:ea typeface="Calibri" panose="020F0502020204030204" pitchFamily="34" charset="0"/>
+                <a:cs typeface="Times New Roman" panose="02020603050405020304" pitchFamily="18" charset="0"/>
+              </a:rPr>
+              <a:t>I want to talk about a huge scandal -currently still ongoing- in the Netherlands, which is related to the mis use of personal sensitive data by the Dutch tax authorities.</a:t>
+            </a:r>
+            <a:endParaRPr lang="en-NL" sz="1800" kern="100" dirty="0">
+              <a:effectLst/>
+              <a:latin typeface="Calibri" panose="020F0502020204030204" pitchFamily="34" charset="0"/>
+              <a:ea typeface="Calibri" panose="020F0502020204030204" pitchFamily="34" charset="0"/>
+              <a:cs typeface="Times New Roman" panose="02020603050405020304" pitchFamily="18" charset="0"/>
+            </a:endParaRPr>
+          </a:p>
+          <a:p>
+            <a:r>
+              <a:rPr lang="en-GB" sz="1800" kern="100" dirty="0">
+                <a:effectLst/>
+                <a:latin typeface="Calibri" panose="020F0502020204030204" pitchFamily="34" charset="0"/>
+                <a:ea typeface="Calibri" panose="020F0502020204030204" pitchFamily="34" charset="0"/>
+                <a:cs typeface="Times New Roman" panose="02020603050405020304" pitchFamily="18" charset="0"/>
+              </a:rPr>
+              <a:t>The underlying question that I want to cover here with this example is basically, do we trust Governments with our personal -sensitive- data.</a:t>
+            </a:r>
+            <a:endParaRPr lang="en-NL" sz="1800" kern="100" dirty="0">
+              <a:effectLst/>
+              <a:latin typeface="Calibri" panose="020F0502020204030204" pitchFamily="34" charset="0"/>
+              <a:ea typeface="Calibri" panose="020F0502020204030204" pitchFamily="34" charset="0"/>
+              <a:cs typeface="Times New Roman" panose="02020603050405020304" pitchFamily="18" charset="0"/>
+            </a:endParaRPr>
+          </a:p>
+          <a:p>
+            <a:r>
+              <a:rPr lang="en-GB" sz="1800" kern="100" dirty="0">
+                <a:effectLst/>
+                <a:latin typeface="Calibri" panose="020F0502020204030204" pitchFamily="34" charset="0"/>
+                <a:ea typeface="Calibri" panose="020F0502020204030204" pitchFamily="34" charset="0"/>
+                <a:cs typeface="Times New Roman" panose="02020603050405020304" pitchFamily="18" charset="0"/>
+              </a:rPr>
+              <a:t> </a:t>
+            </a:r>
+            <a:endParaRPr lang="en-NL" sz="1800" kern="100" dirty="0">
+              <a:effectLst/>
+              <a:latin typeface="Calibri" panose="020F0502020204030204" pitchFamily="34" charset="0"/>
+              <a:ea typeface="Calibri" panose="020F0502020204030204" pitchFamily="34" charset="0"/>
+              <a:cs typeface="Times New Roman" panose="02020603050405020304" pitchFamily="18" charset="0"/>
+            </a:endParaRPr>
+          </a:p>
+          <a:p>
+            <a:r>
+              <a:rPr lang="en-GB" sz="1800" kern="100" dirty="0">
+                <a:effectLst/>
+                <a:latin typeface="Calibri" panose="020F0502020204030204" pitchFamily="34" charset="0"/>
+                <a:ea typeface="Calibri" panose="020F0502020204030204" pitchFamily="34" charset="0"/>
+                <a:cs typeface="Times New Roman" panose="02020603050405020304" pitchFamily="18" charset="0"/>
+              </a:rPr>
+              <a:t>This example is showing some similarities with the rough sleepers one. So I am interested what we think of this.</a:t>
+            </a:r>
+            <a:endParaRPr lang="en-NL" sz="1800" kern="100" dirty="0">
+              <a:effectLst/>
+              <a:latin typeface="Calibri" panose="020F0502020204030204" pitchFamily="34" charset="0"/>
+              <a:ea typeface="Calibri" panose="020F0502020204030204" pitchFamily="34" charset="0"/>
+              <a:cs typeface="Times New Roman" panose="02020603050405020304" pitchFamily="18" charset="0"/>
+            </a:endParaRPr>
           </a:p>
         </p:txBody>
       </p:sp>
@@ -598,9 +660,72 @@
           <a:lstStyle/>
           <a:p>
             <a:r>
-              <a:rPr lang="en-NL" dirty="0"/>
-              <a:t>In the Netherlands</a:t>
-            </a:r>
+              <a:rPr lang="en-GB" sz="1800" kern="100" dirty="0">
+                <a:effectLst/>
+                <a:latin typeface="Calibri" panose="020F0502020204030204" pitchFamily="34" charset="0"/>
+                <a:ea typeface="Calibri" panose="020F0502020204030204" pitchFamily="34" charset="0"/>
+                <a:cs typeface="Times New Roman" panose="02020603050405020304" pitchFamily="18" charset="0"/>
+              </a:rPr>
+              <a:t>A quick overview of the Dutch governmental tax authority system:</a:t>
+            </a:r>
+            <a:endParaRPr lang="en-NL" sz="1800" kern="100" dirty="0">
+              <a:effectLst/>
+              <a:latin typeface="Calibri" panose="020F0502020204030204" pitchFamily="34" charset="0"/>
+              <a:ea typeface="Calibri" panose="020F0502020204030204" pitchFamily="34" charset="0"/>
+              <a:cs typeface="Times New Roman" panose="02020603050405020304" pitchFamily="18" charset="0"/>
+            </a:endParaRPr>
+          </a:p>
+          <a:p>
+            <a:r>
+              <a:rPr lang="en-GB" sz="1800" kern="100" dirty="0">
+                <a:effectLst/>
+                <a:latin typeface="Calibri" panose="020F0502020204030204" pitchFamily="34" charset="0"/>
+                <a:ea typeface="Calibri" panose="020F0502020204030204" pitchFamily="34" charset="0"/>
+                <a:cs typeface="Times New Roman" panose="02020603050405020304" pitchFamily="18" charset="0"/>
+              </a:rPr>
+              <a:t>Like all European (or former-</a:t>
+            </a:r>
+            <a:r>
+              <a:rPr lang="en-GB" sz="1800" kern="100" dirty="0" err="1">
+                <a:effectLst/>
+                <a:latin typeface="Calibri" panose="020F0502020204030204" pitchFamily="34" charset="0"/>
+                <a:ea typeface="Calibri" panose="020F0502020204030204" pitchFamily="34" charset="0"/>
+                <a:cs typeface="Times New Roman" panose="02020603050405020304" pitchFamily="18" charset="0"/>
+              </a:rPr>
+              <a:t>european</a:t>
+            </a:r>
+            <a:r>
+              <a:rPr lang="en-GB" sz="1800" kern="100" dirty="0">
+                <a:effectLst/>
+                <a:latin typeface="Calibri" panose="020F0502020204030204" pitchFamily="34" charset="0"/>
+                <a:ea typeface="Calibri" panose="020F0502020204030204" pitchFamily="34" charset="0"/>
+                <a:cs typeface="Times New Roman" panose="02020603050405020304" pitchFamily="18" charset="0"/>
+              </a:rPr>
+              <a:t>) countries, the tax authorities are responsible for making sure that everyone is paying tax, for which the height is depending of someone’s income.</a:t>
+            </a:r>
+            <a:endParaRPr lang="en-NL" sz="1800" kern="100" dirty="0">
+              <a:effectLst/>
+              <a:latin typeface="Calibri" panose="020F0502020204030204" pitchFamily="34" charset="0"/>
+              <a:ea typeface="Calibri" panose="020F0502020204030204" pitchFamily="34" charset="0"/>
+              <a:cs typeface="Times New Roman" panose="02020603050405020304" pitchFamily="18" charset="0"/>
+            </a:endParaRPr>
+          </a:p>
+          <a:p>
+            <a:r>
+              <a:rPr lang="en-GB" sz="1800" kern="100" dirty="0">
+                <a:effectLst/>
+                <a:latin typeface="Calibri" panose="020F0502020204030204" pitchFamily="34" charset="0"/>
+                <a:ea typeface="Calibri" panose="020F0502020204030204" pitchFamily="34" charset="0"/>
+                <a:cs typeface="Times New Roman" panose="02020603050405020304" pitchFamily="18" charset="0"/>
+              </a:rPr>
+              <a:t>People with a low income can request benefits, which is financial support for basic needs like: rent, healthcare and childcare.</a:t>
+            </a:r>
+            <a:endParaRPr lang="en-NL" sz="1800" kern="100" dirty="0">
+              <a:effectLst/>
+              <a:latin typeface="Calibri" panose="020F0502020204030204" pitchFamily="34" charset="0"/>
+              <a:ea typeface="Calibri" panose="020F0502020204030204" pitchFamily="34" charset="0"/>
+              <a:cs typeface="Times New Roman" panose="02020603050405020304" pitchFamily="18" charset="0"/>
+            </a:endParaRPr>
           </a:p>
         </p:txBody>
       </p:sp>
@@ -684,32 +809,576 @@
           <a:bodyPr/>
           <a:lstStyle/>
           <a:p>
-            <a:pPr marL="0" indent="0">
-              <a:buNone/>
+            <a:r>
+              <a:rPr lang="en-GB" sz="1800" kern="100" dirty="0">
+                <a:effectLst/>
+                <a:latin typeface="Calibri" panose="020F0502020204030204" pitchFamily="34" charset="0"/>
+                <a:ea typeface="Calibri" panose="020F0502020204030204" pitchFamily="34" charset="0"/>
+                <a:cs typeface="Times New Roman" panose="02020603050405020304" pitchFamily="18" charset="0"/>
+              </a:rPr>
+              <a:t>The Childcare Benefits Scandal (I will call it scandal from now) actually comprises of a lot of different issues and cases that have all been binned within one scandal. I will focus on one, where the misuse of data is most prevalent.</a:t>
+            </a:r>
+            <a:endParaRPr lang="en-NL" sz="1800" kern="100" dirty="0">
+              <a:effectLst/>
+              <a:latin typeface="Calibri" panose="020F0502020204030204" pitchFamily="34" charset="0"/>
+              <a:ea typeface="Calibri" panose="020F0502020204030204" pitchFamily="34" charset="0"/>
+              <a:cs typeface="Times New Roman" panose="02020603050405020304" pitchFamily="18" charset="0"/>
+            </a:endParaRPr>
+          </a:p>
+          <a:p>
+            <a:r>
+              <a:rPr lang="en-GB" sz="1800" kern="100" dirty="0">
+                <a:effectLst/>
+                <a:latin typeface="Calibri" panose="020F0502020204030204" pitchFamily="34" charset="0"/>
+                <a:ea typeface="Calibri" panose="020F0502020204030204" pitchFamily="34" charset="0"/>
+                <a:cs typeface="Times New Roman" panose="02020603050405020304" pitchFamily="18" charset="0"/>
+              </a:rPr>
+              <a:t> </a:t>
+            </a:r>
+            <a:endParaRPr lang="en-NL" sz="1800" kern="100" dirty="0">
+              <a:effectLst/>
+              <a:latin typeface="Calibri" panose="020F0502020204030204" pitchFamily="34" charset="0"/>
+              <a:ea typeface="Calibri" panose="020F0502020204030204" pitchFamily="34" charset="0"/>
+              <a:cs typeface="Times New Roman" panose="02020603050405020304" pitchFamily="18" charset="0"/>
+            </a:endParaRPr>
+          </a:p>
+          <a:p>
+            <a:r>
+              <a:rPr lang="en-GB" sz="1800" kern="100" dirty="0">
+                <a:effectLst/>
+                <a:latin typeface="Calibri" panose="020F0502020204030204" pitchFamily="34" charset="0"/>
+                <a:ea typeface="Calibri" panose="020F0502020204030204" pitchFamily="34" charset="0"/>
+                <a:cs typeface="Times New Roman" panose="02020603050405020304" pitchFamily="18" charset="0"/>
+              </a:rPr>
+              <a:t>In short:</a:t>
+            </a:r>
+            <a:br>
+              <a:rPr lang="en-GB" sz="1800" kern="100" dirty="0">
+                <a:effectLst/>
+                <a:latin typeface="Calibri" panose="020F0502020204030204" pitchFamily="34" charset="0"/>
+                <a:ea typeface="Calibri" panose="020F0502020204030204" pitchFamily="34" charset="0"/>
+                <a:cs typeface="Times New Roman" panose="02020603050405020304" pitchFamily="18" charset="0"/>
+              </a:rPr>
+            </a:br>
+            <a:r>
+              <a:rPr lang="en-GB" sz="1800" kern="100" dirty="0">
+                <a:effectLst/>
+                <a:latin typeface="Calibri" panose="020F0502020204030204" pitchFamily="34" charset="0"/>
+                <a:ea typeface="Calibri" panose="020F0502020204030204" pitchFamily="34" charset="0"/>
+                <a:cs typeface="Times New Roman" panose="02020603050405020304" pitchFamily="18" charset="0"/>
+              </a:rPr>
+              <a:t>Based on false fraud accusations, parents were forced to pay back all benefits they received in the past. Which resulted in enormous personal debts, these debts caused a cascade of social problems.</a:t>
+            </a:r>
+            <a:endParaRPr lang="en-NL" sz="1800" kern="100" dirty="0">
+              <a:effectLst/>
+              <a:latin typeface="Calibri" panose="020F0502020204030204" pitchFamily="34" charset="0"/>
+              <a:ea typeface="Calibri" panose="020F0502020204030204" pitchFamily="34" charset="0"/>
+              <a:cs typeface="Times New Roman" panose="02020603050405020304" pitchFamily="18" charset="0"/>
+            </a:endParaRPr>
+          </a:p>
+          <a:p>
+            <a:br>
+              <a:rPr lang="en-GB" sz="1800" kern="100" dirty="0">
+                <a:effectLst/>
+                <a:latin typeface="Calibri" panose="020F0502020204030204" pitchFamily="34" charset="0"/>
+                <a:ea typeface="Calibri" panose="020F0502020204030204" pitchFamily="34" charset="0"/>
+                <a:cs typeface="Times New Roman" panose="02020603050405020304" pitchFamily="18" charset="0"/>
+              </a:rPr>
+            </a:br>
+            <a:r>
+              <a:rPr lang="en-GB" sz="1800" kern="100" dirty="0">
+                <a:effectLst/>
+                <a:latin typeface="Calibri" panose="020F0502020204030204" pitchFamily="34" charset="0"/>
+                <a:ea typeface="Calibri" panose="020F0502020204030204" pitchFamily="34" charset="0"/>
+                <a:cs typeface="Times New Roman" panose="02020603050405020304" pitchFamily="18" charset="0"/>
+              </a:rPr>
+              <a:t>The scandal happened between 2004-2019, and 70k children and 26k parents involved. </a:t>
+            </a:r>
+            <a:endParaRPr lang="en-NL" sz="1800" kern="100" dirty="0">
+              <a:effectLst/>
+              <a:latin typeface="Calibri" panose="020F0502020204030204" pitchFamily="34" charset="0"/>
+              <a:ea typeface="Calibri" panose="020F0502020204030204" pitchFamily="34" charset="0"/>
+              <a:cs typeface="Times New Roman" panose="02020603050405020304" pitchFamily="18" charset="0"/>
+            </a:endParaRPr>
+          </a:p>
+          <a:p>
+            <a:endParaRPr lang="en-NL" dirty="0"/>
+          </a:p>
+        </p:txBody>
+      </p:sp>
+      <p:sp>
+        <p:nvSpPr>
+          <p:cNvPr id="4" name="Slide Number Placeholder 3"/>
+          <p:cNvSpPr>
+            <a:spLocks noGrp="1"/>
+          </p:cNvSpPr>
+          <p:nvPr>
+            <p:ph type="sldNum" sz="quarter" idx="5"/>
+          </p:nvPr>
+        </p:nvSpPr>
+        <p:spPr/>
+        <p:txBody>
+          <a:bodyPr/>
+          <a:lstStyle/>
+          <a:p>
+            <a:fld id="{F92120A5-E2F4-1646-B1C8-F0BAF99A0511}" type="slidenum">
+              <a:rPr lang="en-NL" smtClean="0"/>
+              <a:t>4</a:t>
+            </a:fld>
+            <a:endParaRPr lang="en-NL"/>
+          </a:p>
+        </p:txBody>
+      </p:sp>
+    </p:spTree>
+    <p:extLst>
+      <p:ext uri="{BB962C8B-B14F-4D97-AF65-F5344CB8AC3E}">
+        <p14:creationId xmlns:p14="http://schemas.microsoft.com/office/powerpoint/2010/main" val="2866293985"/>
+      </p:ext>
+    </p:extLst>
+  </p:cSld>
+  <p:clrMapOvr>
+    <a:masterClrMapping/>
+  </p:clrMapOvr>
+</p:notes>
+</file>
+
+<file path=ppt/notesSlides/notesSlide4.xml><?xml version="1.0" encoding="utf-8"?>
+<p:notes xmlns:a="http://schemas.openxmlformats.org/drawingml/2006/main" xmlns:r="http://schemas.openxmlformats.org/officeDocument/2006/relationships" xmlns:p="http://schemas.openxmlformats.org/presentationml/2006/main">
+  <p:cSld>
+    <p:spTree>
+      <p:nvGrpSpPr>
+        <p:cNvPr id="1" name=""/>
+        <p:cNvGrpSpPr/>
+        <p:nvPr/>
+      </p:nvGrpSpPr>
+      <p:grpSpPr>
+        <a:xfrm>
+          <a:off x="0" y="0"/>
+          <a:ext cx="0" cy="0"/>
+          <a:chOff x="0" y="0"/>
+          <a:chExt cx="0" cy="0"/>
+        </a:xfrm>
+      </p:grpSpPr>
+      <p:sp>
+        <p:nvSpPr>
+          <p:cNvPr id="2" name="Slide Image Placeholder 1"/>
+          <p:cNvSpPr>
+            <a:spLocks noGrp="1" noRot="1" noChangeAspect="1"/>
+          </p:cNvSpPr>
+          <p:nvPr>
+            <p:ph type="sldImg"/>
+          </p:nvPr>
+        </p:nvSpPr>
+        <p:spPr/>
+      </p:sp>
+      <p:sp>
+        <p:nvSpPr>
+          <p:cNvPr id="3" name="Notes Placeholder 2"/>
+          <p:cNvSpPr>
+            <a:spLocks noGrp="1"/>
+          </p:cNvSpPr>
+          <p:nvPr>
+            <p:ph type="body" idx="1"/>
+          </p:nvPr>
+        </p:nvSpPr>
+        <p:spPr/>
+        <p:txBody>
+          <a:bodyPr/>
+          <a:lstStyle/>
+          <a:p>
+            <a:r>
+              <a:rPr lang="en-GB" sz="1800" kern="100" dirty="0">
+                <a:effectLst/>
+                <a:latin typeface="Calibri" panose="020F0502020204030204" pitchFamily="34" charset="0"/>
+                <a:ea typeface="Calibri" panose="020F0502020204030204" pitchFamily="34" charset="0"/>
+                <a:cs typeface="Times New Roman" panose="02020603050405020304" pitchFamily="18" charset="0"/>
+              </a:rPr>
+              <a:t>What caused these false accusations?</a:t>
+            </a:r>
+            <a:endParaRPr lang="en-NL" sz="1800" kern="100" dirty="0">
+              <a:effectLst/>
+              <a:latin typeface="Calibri" panose="020F0502020204030204" pitchFamily="34" charset="0"/>
+              <a:ea typeface="Calibri" panose="020F0502020204030204" pitchFamily="34" charset="0"/>
+              <a:cs typeface="Times New Roman" panose="02020603050405020304" pitchFamily="18" charset="0"/>
+            </a:endParaRPr>
+          </a:p>
+          <a:p>
+            <a:r>
+              <a:rPr lang="en-GB" sz="1800" kern="100" dirty="0">
+                <a:effectLst/>
+                <a:latin typeface="Calibri" panose="020F0502020204030204" pitchFamily="34" charset="0"/>
+                <a:ea typeface="Calibri" panose="020F0502020204030204" pitchFamily="34" charset="0"/>
+                <a:cs typeface="Times New Roman" panose="02020603050405020304" pitchFamily="18" charset="0"/>
+              </a:rPr>
+              <a:t>The tax authorities check peoples income at random to see if they are entitled benefits, and if they potentially find people committing fraud.</a:t>
+            </a:r>
+            <a:endParaRPr lang="en-NL" sz="1800" kern="100" dirty="0">
+              <a:effectLst/>
+              <a:latin typeface="Calibri" panose="020F0502020204030204" pitchFamily="34" charset="0"/>
+              <a:ea typeface="Calibri" panose="020F0502020204030204" pitchFamily="34" charset="0"/>
+              <a:cs typeface="Times New Roman" panose="02020603050405020304" pitchFamily="18" charset="0"/>
+            </a:endParaRPr>
+          </a:p>
+          <a:p>
+            <a:r>
+              <a:rPr lang="en-GB" sz="1800" kern="100" dirty="0">
+                <a:effectLst/>
+                <a:latin typeface="Calibri" panose="020F0502020204030204" pitchFamily="34" charset="0"/>
+                <a:ea typeface="Calibri" panose="020F0502020204030204" pitchFamily="34" charset="0"/>
+                <a:cs typeface="Times New Roman" panose="02020603050405020304" pitchFamily="18" charset="0"/>
+              </a:rPr>
+              <a:t>Except people on a potential fraud list: they are all being checked..</a:t>
+            </a:r>
+            <a:endParaRPr lang="en-NL" sz="1800" kern="100" dirty="0">
+              <a:effectLst/>
+              <a:latin typeface="Calibri" panose="020F0502020204030204" pitchFamily="34" charset="0"/>
+              <a:ea typeface="Calibri" panose="020F0502020204030204" pitchFamily="34" charset="0"/>
+              <a:cs typeface="Times New Roman" panose="02020603050405020304" pitchFamily="18" charset="0"/>
+            </a:endParaRPr>
+          </a:p>
+          <a:p>
+            <a:r>
+              <a:rPr lang="en-GB" sz="1800" kern="100" dirty="0">
+                <a:effectLst/>
+                <a:latin typeface="Calibri" panose="020F0502020204030204" pitchFamily="34" charset="0"/>
+                <a:ea typeface="Calibri" panose="020F0502020204030204" pitchFamily="34" charset="0"/>
+                <a:cs typeface="Times New Roman" panose="02020603050405020304" pitchFamily="18" charset="0"/>
+              </a:rPr>
+              <a:t>In case mistakes/fraud is found (wrong dates, names or numbers): benefits have to be returned.</a:t>
+            </a:r>
+            <a:endParaRPr lang="en-NL" sz="1800" kern="100" dirty="0">
+              <a:effectLst/>
+              <a:latin typeface="Calibri" panose="020F0502020204030204" pitchFamily="34" charset="0"/>
+              <a:ea typeface="Calibri" panose="020F0502020204030204" pitchFamily="34" charset="0"/>
+              <a:cs typeface="Times New Roman" panose="02020603050405020304" pitchFamily="18" charset="0"/>
+            </a:endParaRPr>
+          </a:p>
+          <a:p>
+            <a:r>
+              <a:rPr lang="en-GB" sz="1800" kern="100" dirty="0">
+                <a:effectLst/>
+                <a:latin typeface="Calibri" panose="020F0502020204030204" pitchFamily="34" charset="0"/>
+                <a:ea typeface="Calibri" panose="020F0502020204030204" pitchFamily="34" charset="0"/>
+                <a:cs typeface="Times New Roman" panose="02020603050405020304" pitchFamily="18" charset="0"/>
+              </a:rPr>
+              <a:t> </a:t>
+            </a:r>
+            <a:endParaRPr lang="en-NL" sz="1800" kern="100" dirty="0">
+              <a:effectLst/>
+              <a:latin typeface="Calibri" panose="020F0502020204030204" pitchFamily="34" charset="0"/>
+              <a:ea typeface="Calibri" panose="020F0502020204030204" pitchFamily="34" charset="0"/>
+              <a:cs typeface="Times New Roman" panose="02020603050405020304" pitchFamily="18" charset="0"/>
+            </a:endParaRPr>
+          </a:p>
+          <a:p>
+            <a:pPr marL="342900" lvl="0" indent="-342900">
+              <a:buFont typeface="Wingdings" pitchFamily="2" charset="2"/>
+              <a:buChar char=""/>
             </a:pPr>
             <a:r>
-              <a:rPr lang="en-GB" dirty="0"/>
-              <a:t>1. use of data to improve healthcare for minorities</a:t>
-            </a:r>
-          </a:p>
-          <a:p>
-            <a:pPr marL="0" indent="0">
-              <a:buNone/>
+              <a:rPr lang="en-GB" sz="1800" kern="100" dirty="0">
+                <a:effectLst/>
+                <a:latin typeface="Calibri" panose="020F0502020204030204" pitchFamily="34" charset="0"/>
+                <a:ea typeface="Calibri" panose="020F0502020204030204" pitchFamily="34" charset="0"/>
+                <a:cs typeface="Times New Roman" panose="02020603050405020304" pitchFamily="18" charset="0"/>
+              </a:rPr>
+              <a:t>The statistics showed that people with 2</a:t>
+            </a:r>
+            <a:r>
+              <a:rPr lang="en-GB" sz="1800" kern="100" baseline="30000" dirty="0">
+                <a:effectLst/>
+                <a:latin typeface="Calibri" panose="020F0502020204030204" pitchFamily="34" charset="0"/>
+                <a:ea typeface="Calibri" panose="020F0502020204030204" pitchFamily="34" charset="0"/>
+                <a:cs typeface="Times New Roman" panose="02020603050405020304" pitchFamily="18" charset="0"/>
+              </a:rPr>
+              <a:t>nd</a:t>
+            </a:r>
+            <a:r>
+              <a:rPr lang="en-GB" sz="1800" kern="100" dirty="0">
+                <a:effectLst/>
+                <a:latin typeface="Calibri" panose="020F0502020204030204" pitchFamily="34" charset="0"/>
+                <a:ea typeface="Calibri" panose="020F0502020204030204" pitchFamily="34" charset="0"/>
+                <a:cs typeface="Times New Roman" panose="02020603050405020304" pitchFamily="18" charset="0"/>
+              </a:rPr>
+              <a:t> nationality had a higher chance of making mistakes/committing fraud.</a:t>
+            </a:r>
+            <a:endParaRPr lang="en-NL" sz="1800" kern="100" dirty="0">
+              <a:effectLst/>
+              <a:latin typeface="Calibri" panose="020F0502020204030204" pitchFamily="34" charset="0"/>
+              <a:ea typeface="Calibri" panose="020F0502020204030204" pitchFamily="34" charset="0"/>
+              <a:cs typeface="Times New Roman" panose="02020603050405020304" pitchFamily="18" charset="0"/>
+            </a:endParaRPr>
+          </a:p>
+          <a:p>
+            <a:pPr marL="342900" lvl="0" indent="-342900">
+              <a:buFont typeface="Wingdings" pitchFamily="2" charset="2"/>
+              <a:buChar char=""/>
             </a:pPr>
             <a:r>
-              <a:rPr lang="en-GB" sz="2800" dirty="0"/>
-              <a:t>2. help/target groups with special needs </a:t>
-            </a:r>
+              <a:rPr lang="en-GB" sz="1800" kern="100" dirty="0">
+                <a:effectLst/>
+                <a:latin typeface="Calibri" panose="020F0502020204030204" pitchFamily="34" charset="0"/>
+                <a:ea typeface="Calibri" panose="020F0502020204030204" pitchFamily="34" charset="0"/>
+                <a:cs typeface="Times New Roman" panose="02020603050405020304" pitchFamily="18" charset="0"/>
+              </a:rPr>
+              <a:t>Personal data used to bin people on a fraud list</a:t>
+            </a:r>
+            <a:endParaRPr lang="en-NL" sz="1800" kern="100" dirty="0">
+              <a:effectLst/>
+              <a:latin typeface="Calibri" panose="020F0502020204030204" pitchFamily="34" charset="0"/>
+              <a:ea typeface="Calibri" panose="020F0502020204030204" pitchFamily="34" charset="0"/>
+              <a:cs typeface="Times New Roman" panose="02020603050405020304" pitchFamily="18" charset="0"/>
+            </a:endParaRPr>
+          </a:p>
+          <a:p>
+            <a:pPr marL="342900" lvl="0" indent="-342900">
+              <a:buFont typeface="Wingdings" pitchFamily="2" charset="2"/>
+              <a:buChar char=""/>
+            </a:pPr>
+            <a:r>
+              <a:rPr lang="en-GB" sz="1800" kern="100" dirty="0">
+                <a:effectLst/>
+                <a:latin typeface="Calibri" panose="020F0502020204030204" pitchFamily="34" charset="0"/>
+                <a:ea typeface="Calibri" panose="020F0502020204030204" pitchFamily="34" charset="0"/>
+                <a:cs typeface="Times New Roman" panose="02020603050405020304" pitchFamily="18" charset="0"/>
+              </a:rPr>
+              <a:t>People with 2</a:t>
+            </a:r>
+            <a:r>
+              <a:rPr lang="en-GB" sz="1800" kern="100" baseline="30000" dirty="0">
+                <a:effectLst/>
+                <a:latin typeface="Calibri" panose="020F0502020204030204" pitchFamily="34" charset="0"/>
+                <a:ea typeface="Calibri" panose="020F0502020204030204" pitchFamily="34" charset="0"/>
+                <a:cs typeface="Times New Roman" panose="02020603050405020304" pitchFamily="18" charset="0"/>
+              </a:rPr>
+              <a:t>nd</a:t>
+            </a:r>
+            <a:r>
+              <a:rPr lang="en-GB" sz="1800" kern="100" dirty="0">
+                <a:effectLst/>
+                <a:latin typeface="Calibri" panose="020F0502020204030204" pitchFamily="34" charset="0"/>
+                <a:ea typeface="Calibri" panose="020F0502020204030204" pitchFamily="34" charset="0"/>
+                <a:cs typeface="Times New Roman" panose="02020603050405020304" pitchFamily="18" charset="0"/>
+              </a:rPr>
+              <a:t> nationality were more likely to make application mistakes </a:t>
+            </a:r>
+            <a:endParaRPr lang="en-NL" sz="1800" kern="100" dirty="0">
+              <a:effectLst/>
+              <a:latin typeface="Calibri" panose="020F0502020204030204" pitchFamily="34" charset="0"/>
+              <a:ea typeface="Calibri" panose="020F0502020204030204" pitchFamily="34" charset="0"/>
+              <a:cs typeface="Times New Roman" panose="02020603050405020304" pitchFamily="18" charset="0"/>
+            </a:endParaRPr>
+          </a:p>
+          <a:p>
+            <a:pPr marL="342900" lvl="0" indent="-342900">
+              <a:buFont typeface="Wingdings" pitchFamily="2" charset="2"/>
+              <a:buChar char=""/>
+            </a:pPr>
+            <a:r>
+              <a:rPr lang="en-GB" sz="1800" kern="100" dirty="0">
+                <a:effectLst/>
+                <a:latin typeface="Calibri" panose="020F0502020204030204" pitchFamily="34" charset="0"/>
+                <a:ea typeface="Calibri" panose="020F0502020204030204" pitchFamily="34" charset="0"/>
+                <a:cs typeface="Times New Roman" panose="02020603050405020304" pitchFamily="18" charset="0"/>
+              </a:rPr>
+              <a:t>This was marked as fraud and forced repayment caused personal drama’s </a:t>
+            </a:r>
+            <a:endParaRPr lang="en-NL" sz="1800" kern="100" dirty="0">
+              <a:effectLst/>
+              <a:latin typeface="Calibri" panose="020F0502020204030204" pitchFamily="34" charset="0"/>
+              <a:ea typeface="Calibri" panose="020F0502020204030204" pitchFamily="34" charset="0"/>
+              <a:cs typeface="Times New Roman" panose="02020603050405020304" pitchFamily="18" charset="0"/>
+            </a:endParaRPr>
+          </a:p>
+          <a:p>
             <a:endParaRPr lang="en-NL" dirty="0"/>
           </a:p>
-          <a:p>
-            <a:endParaRPr lang="en-NL" dirty="0"/>
-          </a:p>
-          <a:p>
-            <a:r>
-              <a:rPr lang="en-NL" dirty="0"/>
-              <a:t>e.g. cancer health disparity</a:t>
-            </a:r>
+        </p:txBody>
+      </p:sp>
+      <p:sp>
+        <p:nvSpPr>
+          <p:cNvPr id="4" name="Slide Number Placeholder 3"/>
+          <p:cNvSpPr>
+            <a:spLocks noGrp="1"/>
+          </p:cNvSpPr>
+          <p:nvPr>
+            <p:ph type="sldNum" sz="quarter" idx="5"/>
+          </p:nvPr>
+        </p:nvSpPr>
+        <p:spPr/>
+        <p:txBody>
+          <a:bodyPr/>
+          <a:lstStyle/>
+          <a:p>
+            <a:fld id="{F92120A5-E2F4-1646-B1C8-F0BAF99A0511}" type="slidenum">
+              <a:rPr lang="en-NL" smtClean="0"/>
+              <a:t>5</a:t>
+            </a:fld>
+            <a:endParaRPr lang="en-NL"/>
+          </a:p>
+        </p:txBody>
+      </p:sp>
+    </p:spTree>
+    <p:extLst>
+      <p:ext uri="{BB962C8B-B14F-4D97-AF65-F5344CB8AC3E}">
+        <p14:creationId xmlns:p14="http://schemas.microsoft.com/office/powerpoint/2010/main" val="4261177678"/>
+      </p:ext>
+    </p:extLst>
+  </p:cSld>
+  <p:clrMapOvr>
+    <a:masterClrMapping/>
+  </p:clrMapOvr>
+</p:notes>
+</file>
+
+<file path=ppt/notesSlides/notesSlide5.xml><?xml version="1.0" encoding="utf-8"?>
+<p:notes xmlns:a="http://schemas.openxmlformats.org/drawingml/2006/main" xmlns:r="http://schemas.openxmlformats.org/officeDocument/2006/relationships" xmlns:p="http://schemas.openxmlformats.org/presentationml/2006/main">
+  <p:cSld>
+    <p:spTree>
+      <p:nvGrpSpPr>
+        <p:cNvPr id="1" name=""/>
+        <p:cNvGrpSpPr/>
+        <p:nvPr/>
+      </p:nvGrpSpPr>
+      <p:grpSpPr>
+        <a:xfrm>
+          <a:off x="0" y="0"/>
+          <a:ext cx="0" cy="0"/>
+          <a:chOff x="0" y="0"/>
+          <a:chExt cx="0" cy="0"/>
+        </a:xfrm>
+      </p:grpSpPr>
+      <p:sp>
+        <p:nvSpPr>
+          <p:cNvPr id="2" name="Slide Image Placeholder 1"/>
+          <p:cNvSpPr>
+            <a:spLocks noGrp="1" noRot="1" noChangeAspect="1"/>
+          </p:cNvSpPr>
+          <p:nvPr>
+            <p:ph type="sldImg"/>
+          </p:nvPr>
+        </p:nvSpPr>
+        <p:spPr/>
+      </p:sp>
+      <p:sp>
+        <p:nvSpPr>
+          <p:cNvPr id="3" name="Notes Placeholder 2"/>
+          <p:cNvSpPr>
+            <a:spLocks noGrp="1"/>
+          </p:cNvSpPr>
+          <p:nvPr>
+            <p:ph type="body" idx="1"/>
+          </p:nvPr>
+        </p:nvSpPr>
+        <p:spPr/>
+        <p:txBody>
+          <a:bodyPr/>
+          <a:lstStyle/>
+          <a:p>
+            <a:r>
+              <a:rPr lang="en-GB" sz="1800" kern="100" dirty="0">
+                <a:effectLst/>
+                <a:latin typeface="Calibri" panose="020F0502020204030204" pitchFamily="34" charset="0"/>
+                <a:ea typeface="Calibri" panose="020F0502020204030204" pitchFamily="34" charset="0"/>
+                <a:cs typeface="Times New Roman" panose="02020603050405020304" pitchFamily="18" charset="0"/>
+              </a:rPr>
+              <a:t>The ethical issues here are clear.</a:t>
+            </a:r>
+            <a:br>
+              <a:rPr lang="en-GB" sz="1800" kern="100" dirty="0">
+                <a:effectLst/>
+                <a:latin typeface="Calibri" panose="020F0502020204030204" pitchFamily="34" charset="0"/>
+                <a:ea typeface="Calibri" panose="020F0502020204030204" pitchFamily="34" charset="0"/>
+                <a:cs typeface="Times New Roman" panose="02020603050405020304" pitchFamily="18" charset="0"/>
+              </a:rPr>
+            </a:br>
+            <a:r>
+              <a:rPr lang="en-GB" sz="1800" kern="100" dirty="0">
+                <a:effectLst/>
+                <a:latin typeface="Calibri" panose="020F0502020204030204" pitchFamily="34" charset="0"/>
+                <a:ea typeface="Calibri" panose="020F0502020204030204" pitchFamily="34" charset="0"/>
+                <a:cs typeface="Times New Roman" panose="02020603050405020304" pitchFamily="18" charset="0"/>
+              </a:rPr>
+              <a:t>I personally think that governments can use personal, sensitive data for the greater good. </a:t>
+            </a:r>
+            <a:br>
+              <a:rPr lang="en-GB" sz="1800" kern="100" dirty="0">
+                <a:effectLst/>
+                <a:latin typeface="Calibri" panose="020F0502020204030204" pitchFamily="34" charset="0"/>
+                <a:ea typeface="Calibri" panose="020F0502020204030204" pitchFamily="34" charset="0"/>
+                <a:cs typeface="Times New Roman" panose="02020603050405020304" pitchFamily="18" charset="0"/>
+              </a:rPr>
+            </a:br>
+            <a:r>
+              <a:rPr lang="en-GB" sz="1800" kern="100" dirty="0">
+                <a:effectLst/>
+                <a:latin typeface="Calibri" panose="020F0502020204030204" pitchFamily="34" charset="0"/>
+                <a:ea typeface="Calibri" panose="020F0502020204030204" pitchFamily="34" charset="0"/>
+                <a:cs typeface="Times New Roman" panose="02020603050405020304" pitchFamily="18" charset="0"/>
+              </a:rPr>
+              <a:t>E.g. research of certain types of cancer that are more common among minorities.</a:t>
+            </a:r>
+            <a:endParaRPr lang="en-NL" sz="1800" kern="100" dirty="0">
+              <a:effectLst/>
+              <a:latin typeface="Calibri" panose="020F0502020204030204" pitchFamily="34" charset="0"/>
+              <a:ea typeface="Calibri" panose="020F0502020204030204" pitchFamily="34" charset="0"/>
+              <a:cs typeface="Times New Roman" panose="02020603050405020304" pitchFamily="18" charset="0"/>
+            </a:endParaRPr>
+          </a:p>
+          <a:p>
+            <a:r>
+              <a:rPr lang="en-GB" sz="1800" kern="100" dirty="0">
+                <a:effectLst/>
+                <a:latin typeface="Calibri" panose="020F0502020204030204" pitchFamily="34" charset="0"/>
+                <a:ea typeface="Calibri" panose="020F0502020204030204" pitchFamily="34" charset="0"/>
+                <a:cs typeface="Times New Roman" panose="02020603050405020304" pitchFamily="18" charset="0"/>
+              </a:rPr>
+              <a:t>Main issues:</a:t>
+            </a:r>
+            <a:br>
+              <a:rPr lang="en-GB" sz="1800" kern="100" dirty="0">
+                <a:effectLst/>
+                <a:latin typeface="Calibri" panose="020F0502020204030204" pitchFamily="34" charset="0"/>
+                <a:ea typeface="Calibri" panose="020F0502020204030204" pitchFamily="34" charset="0"/>
+                <a:cs typeface="Times New Roman" panose="02020603050405020304" pitchFamily="18" charset="0"/>
+              </a:rPr>
+            </a:br>
+            <a:r>
+              <a:rPr lang="en-GB" sz="1800" kern="100" dirty="0">
+                <a:effectLst/>
+                <a:latin typeface="Calibri" panose="020F0502020204030204" pitchFamily="34" charset="0"/>
+                <a:ea typeface="Calibri" panose="020F0502020204030204" pitchFamily="34" charset="0"/>
+                <a:cs typeface="Times New Roman" panose="02020603050405020304" pitchFamily="18" charset="0"/>
+              </a:rPr>
+              <a:t>- Do we trust governments with out data, this example shows what can go wrong!</a:t>
+            </a:r>
+            <a:endParaRPr lang="en-NL" sz="1800" kern="100" dirty="0">
+              <a:effectLst/>
+              <a:latin typeface="Calibri" panose="020F0502020204030204" pitchFamily="34" charset="0"/>
+              <a:ea typeface="Calibri" panose="020F0502020204030204" pitchFamily="34" charset="0"/>
+              <a:cs typeface="Times New Roman" panose="02020603050405020304" pitchFamily="18" charset="0"/>
+            </a:endParaRPr>
+          </a:p>
+          <a:p>
+            <a:pPr marL="342900" lvl="0" indent="-342900">
+              <a:buFont typeface="Calibri" panose="020F0502020204030204" pitchFamily="34" charset="0"/>
+              <a:buChar char="-"/>
+            </a:pPr>
+            <a:r>
+              <a:rPr lang="en-GB" sz="1800" kern="100" dirty="0">
+                <a:effectLst/>
+                <a:latin typeface="Calibri" panose="020F0502020204030204" pitchFamily="34" charset="0"/>
+                <a:ea typeface="Calibri" panose="020F0502020204030204" pitchFamily="34" charset="0"/>
+                <a:cs typeface="Times New Roman" panose="02020603050405020304" pitchFamily="18" charset="0"/>
+              </a:rPr>
+              <a:t>Governments do change, uncertain where we are in 100 years.</a:t>
+            </a:r>
+            <a:endParaRPr lang="en-NL" sz="1800" kern="100" dirty="0">
+              <a:effectLst/>
+              <a:latin typeface="Calibri" panose="020F0502020204030204" pitchFamily="34" charset="0"/>
+              <a:ea typeface="Calibri" panose="020F0502020204030204" pitchFamily="34" charset="0"/>
+              <a:cs typeface="Times New Roman" panose="02020603050405020304" pitchFamily="18" charset="0"/>
+            </a:endParaRPr>
           </a:p>
         </p:txBody>
       </p:sp>
@@ -740,6 +1409,162 @@
     <p:extLst>
       <p:ext uri="{BB962C8B-B14F-4D97-AF65-F5344CB8AC3E}">
         <p14:creationId xmlns:p14="http://schemas.microsoft.com/office/powerpoint/2010/main" val="3155410195"/>
+      </p:ext>
+    </p:extLst>
+  </p:cSld>
+  <p:clrMapOvr>
+    <a:masterClrMapping/>
+  </p:clrMapOvr>
+</p:notes>
+</file>
+
+<file path=ppt/notesSlides/notesSlide6.xml><?xml version="1.0" encoding="utf-8"?>
+<p:notes xmlns:a="http://schemas.openxmlformats.org/drawingml/2006/main" xmlns:r="http://schemas.openxmlformats.org/officeDocument/2006/relationships" xmlns:p="http://schemas.openxmlformats.org/presentationml/2006/main">
+  <p:cSld>
+    <p:spTree>
+      <p:nvGrpSpPr>
+        <p:cNvPr id="1" name=""/>
+        <p:cNvGrpSpPr/>
+        <p:nvPr/>
+      </p:nvGrpSpPr>
+      <p:grpSpPr>
+        <a:xfrm>
+          <a:off x="0" y="0"/>
+          <a:ext cx="0" cy="0"/>
+          <a:chOff x="0" y="0"/>
+          <a:chExt cx="0" cy="0"/>
+        </a:xfrm>
+      </p:grpSpPr>
+      <p:sp>
+        <p:nvSpPr>
+          <p:cNvPr id="2" name="Slide Image Placeholder 1"/>
+          <p:cNvSpPr>
+            <a:spLocks noGrp="1" noRot="1" noChangeAspect="1"/>
+          </p:cNvSpPr>
+          <p:nvPr>
+            <p:ph type="sldImg"/>
+          </p:nvPr>
+        </p:nvSpPr>
+        <p:spPr/>
+      </p:sp>
+      <p:sp>
+        <p:nvSpPr>
+          <p:cNvPr id="3" name="Notes Placeholder 2"/>
+          <p:cNvSpPr>
+            <a:spLocks noGrp="1"/>
+          </p:cNvSpPr>
+          <p:nvPr>
+            <p:ph type="body" idx="1"/>
+          </p:nvPr>
+        </p:nvSpPr>
+        <p:spPr/>
+        <p:txBody>
+          <a:bodyPr/>
+          <a:lstStyle/>
+          <a:p>
+            <a:r>
+              <a:rPr lang="en-GB" sz="1800" kern="100" dirty="0">
+                <a:effectLst/>
+                <a:latin typeface="Calibri" panose="020F0502020204030204" pitchFamily="34" charset="0"/>
+                <a:ea typeface="Calibri" panose="020F0502020204030204" pitchFamily="34" charset="0"/>
+                <a:cs typeface="Times New Roman" panose="02020603050405020304" pitchFamily="18" charset="0"/>
+              </a:rPr>
+              <a:t>Solutions:</a:t>
+            </a:r>
+            <a:endParaRPr lang="en-NL" sz="1800" kern="100" dirty="0">
+              <a:effectLst/>
+              <a:latin typeface="Calibri" panose="020F0502020204030204" pitchFamily="34" charset="0"/>
+              <a:ea typeface="Calibri" panose="020F0502020204030204" pitchFamily="34" charset="0"/>
+              <a:cs typeface="Times New Roman" panose="02020603050405020304" pitchFamily="18" charset="0"/>
+            </a:endParaRPr>
+          </a:p>
+          <a:p>
+            <a:pPr marL="342900" lvl="0" indent="-342900">
+              <a:buFont typeface="Wingdings" pitchFamily="2" charset="2"/>
+              <a:buChar char=""/>
+            </a:pPr>
+            <a:r>
+              <a:rPr lang="en-GB" sz="1800" kern="100" dirty="0">
+                <a:effectLst/>
+                <a:latin typeface="Calibri" panose="020F0502020204030204" pitchFamily="34" charset="0"/>
+                <a:ea typeface="Calibri" panose="020F0502020204030204" pitchFamily="34" charset="0"/>
+                <a:cs typeface="Times New Roman" panose="02020603050405020304" pitchFamily="18" charset="0"/>
+              </a:rPr>
+              <a:t>Data that is not recorded cannot be misused, e.g. France..</a:t>
+            </a:r>
+            <a:endParaRPr lang="en-NL" sz="1800" kern="100" dirty="0">
+              <a:effectLst/>
+              <a:latin typeface="Calibri" panose="020F0502020204030204" pitchFamily="34" charset="0"/>
+              <a:ea typeface="Calibri" panose="020F0502020204030204" pitchFamily="34" charset="0"/>
+              <a:cs typeface="Times New Roman" panose="02020603050405020304" pitchFamily="18" charset="0"/>
+            </a:endParaRPr>
+          </a:p>
+          <a:p>
+            <a:r>
+              <a:rPr lang="en-GB" sz="1800" kern="100" dirty="0">
+                <a:effectLst/>
+                <a:latin typeface="Calibri" panose="020F0502020204030204" pitchFamily="34" charset="0"/>
+                <a:ea typeface="Calibri" panose="020F0502020204030204" pitchFamily="34" charset="0"/>
+                <a:cs typeface="Times New Roman" panose="02020603050405020304" pitchFamily="18" charset="0"/>
+              </a:rPr>
+              <a:t>I personally believe in the power of data, personal (sensitive) data can be used for important and useful research. </a:t>
+            </a:r>
+            <a:br>
+              <a:rPr lang="en-GB" sz="1800" kern="100" dirty="0">
+                <a:effectLst/>
+                <a:latin typeface="Calibri" panose="020F0502020204030204" pitchFamily="34" charset="0"/>
+                <a:ea typeface="Calibri" panose="020F0502020204030204" pitchFamily="34" charset="0"/>
+                <a:cs typeface="Times New Roman" panose="02020603050405020304" pitchFamily="18" charset="0"/>
+              </a:rPr>
+            </a:br>
+            <a:r>
+              <a:rPr lang="en-GB" sz="1800" kern="100" dirty="0">
+                <a:effectLst/>
+                <a:latin typeface="Calibri" panose="020F0502020204030204" pitchFamily="34" charset="0"/>
+                <a:ea typeface="Calibri" panose="020F0502020204030204" pitchFamily="34" charset="0"/>
+                <a:cs typeface="Times New Roman" panose="02020603050405020304" pitchFamily="18" charset="0"/>
+              </a:rPr>
+              <a:t>But this data should not be stored/used by organisations that have the authority to exercise governance  and/or make binding decisions.</a:t>
+            </a:r>
+            <a:endParaRPr lang="en-NL" sz="1800" kern="100" dirty="0">
+              <a:effectLst/>
+              <a:latin typeface="Calibri" panose="020F0502020204030204" pitchFamily="34" charset="0"/>
+              <a:ea typeface="Calibri" panose="020F0502020204030204" pitchFamily="34" charset="0"/>
+              <a:cs typeface="Times New Roman" panose="02020603050405020304" pitchFamily="18" charset="0"/>
+            </a:endParaRPr>
+          </a:p>
+          <a:p>
+            <a:endParaRPr lang="en-NL" dirty="0"/>
+          </a:p>
+        </p:txBody>
+      </p:sp>
+      <p:sp>
+        <p:nvSpPr>
+          <p:cNvPr id="4" name="Slide Number Placeholder 3"/>
+          <p:cNvSpPr>
+            <a:spLocks noGrp="1"/>
+          </p:cNvSpPr>
+          <p:nvPr>
+            <p:ph type="sldNum" sz="quarter" idx="5"/>
+          </p:nvPr>
+        </p:nvSpPr>
+        <p:spPr/>
+        <p:txBody>
+          <a:bodyPr/>
+          <a:lstStyle/>
+          <a:p>
+            <a:fld id="{F92120A5-E2F4-1646-B1C8-F0BAF99A0511}" type="slidenum">
+              <a:rPr lang="en-NL" smtClean="0"/>
+              <a:t>7</a:t>
+            </a:fld>
+            <a:endParaRPr lang="en-NL"/>
+          </a:p>
+        </p:txBody>
+      </p:sp>
+    </p:spTree>
+    <p:extLst>
+      <p:ext uri="{BB962C8B-B14F-4D97-AF65-F5344CB8AC3E}">
+        <p14:creationId xmlns:p14="http://schemas.microsoft.com/office/powerpoint/2010/main" val="4173714990"/>
       </p:ext>
     </p:extLst>
   </p:cSld>
@@ -4155,7 +4980,7 @@
         <p:spPr>
           <a:xfrm>
             <a:off x="1237785" y="1070516"/>
-            <a:ext cx="10281115" cy="5386090"/>
+            <a:ext cx="10281115" cy="5016758"/>
           </a:xfrm>
           <a:prstGeom prst="rect">
             <a:avLst/>
@@ -4243,12 +5068,6 @@
           </a:p>
           <a:p>
             <a:endParaRPr lang="en-NL" sz="3600" dirty="0"/>
-          </a:p>
-          <a:p>
-            <a:r>
-              <a:rPr lang="en-NL" sz="2400" dirty="0"/>
-              <a:t>Thijmen Breeschoten DE21</a:t>
-            </a:r>
           </a:p>
           <a:p>
             <a:r>
@@ -4335,13 +5154,12 @@
         <p:spPr/>
         <p:txBody>
           <a:bodyPr>
-            <a:normAutofit lnSpcReduction="10000"/>
+            <a:normAutofit/>
           </a:bodyPr>
           <a:lstStyle/>
           <a:p>
-            <a:pPr>
-              <a:buFontTx/>
-              <a:buChar char="-"/>
+            <a:pPr marL="0" indent="0">
+              <a:buNone/>
             </a:pPr>
             <a:r>
               <a:rPr lang="en-NL" dirty="0"/>
@@ -4349,15 +5167,6 @@
             </a:r>
           </a:p>
           <a:p>
-            <a:pPr marL="914400" lvl="2" indent="0">
-              <a:buNone/>
-            </a:pPr>
-            <a:r>
-              <a:rPr lang="en-NL" sz="2800" dirty="0"/>
-              <a:t>-&gt; responsible for receiving tax</a:t>
-            </a:r>
-          </a:p>
-          <a:p>
             <a:pPr marL="0" indent="0">
               <a:buNone/>
             </a:pPr>
@@ -4382,9 +5191,8 @@
             <a:endParaRPr lang="en-NL" dirty="0"/>
           </a:p>
           <a:p>
-            <a:pPr>
-              <a:buFontTx/>
-              <a:buChar char="-"/>
+            <a:pPr marL="0" indent="0">
+              <a:buNone/>
             </a:pPr>
             <a:r>
               <a:rPr lang="en-NL" dirty="0"/>
@@ -4626,7 +5434,7 @@
             </a:pPr>
             <a:r>
               <a:rPr lang="en-NL" dirty="0"/>
-              <a:t>	-&gt; focus on part involving (mis)-use of data</a:t>
+              <a:t>	</a:t>
             </a:r>
           </a:p>
         </p:txBody>
@@ -4646,7 +5454,7 @@
           <p:nvPr/>
         </p:nvPicPr>
         <p:blipFill>
-          <a:blip r:embed="rId2">
+          <a:blip r:embed="rId3">
             <a:extLst>
               <a:ext uri="{28A0092B-C50C-407E-A947-70E740481C1C}">
                 <a14:useLocalDpi xmlns:a14="http://schemas.microsoft.com/office/drawing/2010/main" val="0"/>
@@ -4660,7 +5468,7 @@
         </p:blipFill>
         <p:spPr bwMode="auto">
           <a:xfrm>
-            <a:off x="7632700" y="3788841"/>
+            <a:off x="7302500" y="3788841"/>
             <a:ext cx="4340225" cy="2704034"/>
           </a:xfrm>
           <a:prstGeom prst="rect">
@@ -4759,9 +5567,8 @@
           </a:bodyPr>
           <a:lstStyle/>
           <a:p>
-            <a:pPr>
-              <a:buFontTx/>
-              <a:buChar char="-"/>
+            <a:pPr marL="0" indent="0">
+              <a:buNone/>
             </a:pPr>
             <a:r>
               <a:rPr lang="en-NL" dirty="0"/>
@@ -4778,18 +5585,10 @@
             </a:r>
           </a:p>
           <a:p>
-            <a:pPr>
-              <a:buFontTx/>
-              <a:buChar char="-"/>
+            <a:pPr marL="0" indent="0">
+              <a:buNone/>
             </a:pPr>
-            <a:r>
-              <a:rPr lang="en-GB" dirty="0"/>
-              <a:t>F</a:t>
-            </a:r>
-            <a:r>
-              <a:rPr lang="en-NL" dirty="0"/>
-              <a:t>orced repayments in case of mistake/fraud</a:t>
-            </a:r>
+            <a:endParaRPr lang="en-NL" dirty="0"/>
           </a:p>
           <a:p>
             <a:pPr marL="0" indent="0">
@@ -4823,7 +5622,7 @@
             </a:pPr>
             <a:r>
               <a:rPr lang="en-NL" dirty="0"/>
-              <a:t>-&gt; Dutch not first language: application mistakes likely</a:t>
+              <a:t>-&gt; 2nd language: application mistakes likely</a:t>
             </a:r>
           </a:p>
           <a:p>
@@ -4849,6 +5648,53 @@
           </a:p>
         </p:txBody>
       </p:sp>
+      <p:pic>
+        <p:nvPicPr>
+          <p:cNvPr id="6146" name="Picture 2" descr="Black And White Photograph - Spiralling Down by Renee Doyle">
+            <a:extLst>
+              <a:ext uri="{FF2B5EF4-FFF2-40B4-BE49-F238E27FC236}">
+                <a16:creationId xmlns:a16="http://schemas.microsoft.com/office/drawing/2014/main" id="{F7529808-D8D2-B709-A8B3-1C001CB96D8A}"/>
+              </a:ext>
+            </a:extLst>
+          </p:cNvPr>
+          <p:cNvPicPr>
+            <a:picLocks noChangeAspect="1" noChangeArrowheads="1"/>
+          </p:cNvPicPr>
+          <p:nvPr/>
+        </p:nvPicPr>
+        <p:blipFill>
+          <a:blip r:embed="rId3">
+            <a:extLst>
+              <a:ext uri="{28A0092B-C50C-407E-A947-70E740481C1C}">
+                <a14:useLocalDpi xmlns:a14="http://schemas.microsoft.com/office/drawing/2010/main" val="0"/>
+              </a:ext>
+            </a:extLst>
+          </a:blip>
+          <a:srcRect/>
+          <a:stretch>
+            <a:fillRect/>
+          </a:stretch>
+        </p:blipFill>
+        <p:spPr bwMode="auto">
+          <a:xfrm>
+            <a:off x="7061200" y="144991"/>
+            <a:ext cx="5041900" cy="3361267"/>
+          </a:xfrm>
+          <a:prstGeom prst="rect">
+            <a:avLst/>
+          </a:prstGeom>
+          <a:noFill/>
+          <a:extLst>
+            <a:ext uri="{909E8E84-426E-40DD-AFC4-6F175D3DCCD1}">
+              <a14:hiddenFill xmlns:a14="http://schemas.microsoft.com/office/drawing/2010/main">
+                <a:solidFill>
+                  <a:srgbClr val="FFFFFF"/>
+                </a:solidFill>
+              </a14:hiddenFill>
+            </a:ext>
+          </a:extLst>
+        </p:spPr>
+      </p:pic>
     </p:spTree>
     <p:extLst>
       <p:ext uri="{BB962C8B-B14F-4D97-AF65-F5344CB8AC3E}">
@@ -5141,7 +5987,7 @@
             </a:pPr>
             <a:r>
               <a:rPr lang="en-NL" dirty="0"/>
-              <a:t>- Data that is not recorded cannot be misused</a:t>
+              <a:t>Data that is not recorded cannot be misused</a:t>
             </a:r>
           </a:p>
           <a:p>
@@ -5176,9 +6022,8 @@
             <a:endParaRPr lang="en-NL" dirty="0"/>
           </a:p>
           <a:p>
-            <a:pPr>
-              <a:buFontTx/>
-              <a:buChar char="-"/>
+            <a:pPr marL="0" indent="0">
+              <a:buNone/>
             </a:pPr>
             <a:r>
               <a:rPr lang="en-GB" dirty="0"/>
@@ -5249,7 +6094,7 @@
           <p:nvPr/>
         </p:nvPicPr>
         <p:blipFill>
-          <a:blip r:embed="rId2">
+          <a:blip r:embed="rId3">
             <a:extLst>
               <a:ext uri="{28A0092B-C50C-407E-A947-70E740481C1C}">
                 <a14:useLocalDpi xmlns:a14="http://schemas.microsoft.com/office/drawing/2010/main" val="0"/>
@@ -5263,7 +6108,7 @@
         </p:blipFill>
         <p:spPr bwMode="auto">
           <a:xfrm>
-            <a:off x="7251700" y="25872"/>
+            <a:off x="7239000" y="38572"/>
             <a:ext cx="4940300" cy="3329627"/>
           </a:xfrm>
           <a:prstGeom prst="rect">

</xml_diff>